<commit_message>
Modify illustration of ε-net and fix typo
</commit_message>
<xml_diff>
--- a/other/pptx/epsilon-net.pptx
+++ b/other/pptx/epsilon-net.pptx
@@ -197,7 +197,7 @@
           <a:p>
             <a:fld id="{6E10BCF0-339F-BC49-A140-3C4E6D0CEBFA}" type="datetimeFigureOut">
               <a:rPr lang="en-US" smtClean="0"/>
-              <a:t>2/8/24</a:t>
+              <a:t>2/9/24</a:t>
             </a:fld>
             <a:endParaRPr lang="en-US"/>
           </a:p>
@@ -719,7 +719,7 @@
           <a:p>
             <a:fld id="{9D275D05-B5B6-5946-BDB9-49EE6FE80DE5}" type="datetimeFigureOut">
               <a:rPr lang="en-US" smtClean="0"/>
-              <a:t>2/8/24</a:t>
+              <a:t>2/9/24</a:t>
             </a:fld>
             <a:endParaRPr lang="en-US"/>
           </a:p>
@@ -917,7 +917,7 @@
           <a:p>
             <a:fld id="{9D275D05-B5B6-5946-BDB9-49EE6FE80DE5}" type="datetimeFigureOut">
               <a:rPr lang="en-US" smtClean="0"/>
-              <a:t>2/8/24</a:t>
+              <a:t>2/9/24</a:t>
             </a:fld>
             <a:endParaRPr lang="en-US"/>
           </a:p>
@@ -1125,7 +1125,7 @@
           <a:p>
             <a:fld id="{9D275D05-B5B6-5946-BDB9-49EE6FE80DE5}" type="datetimeFigureOut">
               <a:rPr lang="en-US" smtClean="0"/>
-              <a:t>2/8/24</a:t>
+              <a:t>2/9/24</a:t>
             </a:fld>
             <a:endParaRPr lang="en-US"/>
           </a:p>
@@ -1323,7 +1323,7 @@
           <a:p>
             <a:fld id="{9D275D05-B5B6-5946-BDB9-49EE6FE80DE5}" type="datetimeFigureOut">
               <a:rPr lang="en-US" smtClean="0"/>
-              <a:t>2/8/24</a:t>
+              <a:t>2/9/24</a:t>
             </a:fld>
             <a:endParaRPr lang="en-US"/>
           </a:p>
@@ -1598,7 +1598,7 @@
           <a:p>
             <a:fld id="{9D275D05-B5B6-5946-BDB9-49EE6FE80DE5}" type="datetimeFigureOut">
               <a:rPr lang="en-US" smtClean="0"/>
-              <a:t>2/8/24</a:t>
+              <a:t>2/9/24</a:t>
             </a:fld>
             <a:endParaRPr lang="en-US"/>
           </a:p>
@@ -1863,7 +1863,7 @@
           <a:p>
             <a:fld id="{9D275D05-B5B6-5946-BDB9-49EE6FE80DE5}" type="datetimeFigureOut">
               <a:rPr lang="en-US" smtClean="0"/>
-              <a:t>2/8/24</a:t>
+              <a:t>2/9/24</a:t>
             </a:fld>
             <a:endParaRPr lang="en-US"/>
           </a:p>
@@ -2275,7 +2275,7 @@
           <a:p>
             <a:fld id="{9D275D05-B5B6-5946-BDB9-49EE6FE80DE5}" type="datetimeFigureOut">
               <a:rPr lang="en-US" smtClean="0"/>
-              <a:t>2/8/24</a:t>
+              <a:t>2/9/24</a:t>
             </a:fld>
             <a:endParaRPr lang="en-US"/>
           </a:p>
@@ -2416,7 +2416,7 @@
           <a:p>
             <a:fld id="{9D275D05-B5B6-5946-BDB9-49EE6FE80DE5}" type="datetimeFigureOut">
               <a:rPr lang="en-US" smtClean="0"/>
-              <a:t>2/8/24</a:t>
+              <a:t>2/9/24</a:t>
             </a:fld>
             <a:endParaRPr lang="en-US"/>
           </a:p>
@@ -2529,7 +2529,7 @@
           <a:p>
             <a:fld id="{9D275D05-B5B6-5946-BDB9-49EE6FE80DE5}" type="datetimeFigureOut">
               <a:rPr lang="en-US" smtClean="0"/>
-              <a:t>2/8/24</a:t>
+              <a:t>2/9/24</a:t>
             </a:fld>
             <a:endParaRPr lang="en-US"/>
           </a:p>
@@ -2840,7 +2840,7 @@
           <a:p>
             <a:fld id="{9D275D05-B5B6-5946-BDB9-49EE6FE80DE5}" type="datetimeFigureOut">
               <a:rPr lang="en-US" smtClean="0"/>
-              <a:t>2/8/24</a:t>
+              <a:t>2/9/24</a:t>
             </a:fld>
             <a:endParaRPr lang="en-US"/>
           </a:p>
@@ -3128,7 +3128,7 @@
           <a:p>
             <a:fld id="{9D275D05-B5B6-5946-BDB9-49EE6FE80DE5}" type="datetimeFigureOut">
               <a:rPr lang="en-US" smtClean="0"/>
-              <a:t>2/8/24</a:t>
+              <a:t>2/9/24</a:t>
             </a:fld>
             <a:endParaRPr lang="en-US"/>
           </a:p>
@@ -3369,7 +3369,7 @@
           <a:p>
             <a:fld id="{9D275D05-B5B6-5946-BDB9-49EE6FE80DE5}" type="datetimeFigureOut">
               <a:rPr lang="en-US" smtClean="0"/>
-              <a:t>2/8/24</a:t>
+              <a:t>2/9/24</a:t>
             </a:fld>
             <a:endParaRPr lang="en-US"/>
           </a:p>
@@ -3794,10 +3794,10 @@
       </p:grpSpPr>
       <p:grpSp>
         <p:nvGrpSpPr>
-          <p:cNvPr id="40" name="Group 39">
-            <a:extLst>
-              <a:ext uri="{FF2B5EF4-FFF2-40B4-BE49-F238E27FC236}">
-                <a16:creationId xmlns:a16="http://schemas.microsoft.com/office/drawing/2014/main" id="{E411D29D-94B8-A558-65AB-3B2986EEB475}"/>
+          <p:cNvPr id="4" name="Group 3">
+            <a:extLst>
+              <a:ext uri="{FF2B5EF4-FFF2-40B4-BE49-F238E27FC236}">
+                <a16:creationId xmlns:a16="http://schemas.microsoft.com/office/drawing/2014/main" id="{E8FDE8D7-8BD0-2A76-2B2D-D075F81A6206}"/>
               </a:ext>
             </a:extLst>
           </p:cNvPr>
@@ -3826,14 +3826,14 @@
           </p:nvSpPr>
           <p:spPr>
             <a:xfrm>
-              <a:off x="1798320" y="1005840"/>
-              <a:ext cx="8595360" cy="4846320"/>
+              <a:off x="1981726" y="1325880"/>
+              <a:ext cx="8228549" cy="4206240"/>
             </a:xfrm>
             <a:prstGeom prst="ellipse">
               <a:avLst/>
             </a:prstGeom>
             <a:noFill/>
-            <a:ln w="57150">
+            <a:ln w="76200">
               <a:solidFill>
                 <a:schemeClr val="tx1"/>
               </a:solidFill>

</xml_diff>

<commit_message>
Modify illustration of ε-net again
</commit_message>
<xml_diff>
--- a/other/pptx/epsilon-net.pptx
+++ b/other/pptx/epsilon-net.pptx
@@ -197,7 +197,7 @@
           <a:p>
             <a:fld id="{6E10BCF0-339F-BC49-A140-3C4E6D0CEBFA}" type="datetimeFigureOut">
               <a:rPr lang="en-US" smtClean="0"/>
-              <a:t>2/9/24</a:t>
+              <a:t>2/13/24</a:t>
             </a:fld>
             <a:endParaRPr lang="en-US"/>
           </a:p>
@@ -719,7 +719,7 @@
           <a:p>
             <a:fld id="{9D275D05-B5B6-5946-BDB9-49EE6FE80DE5}" type="datetimeFigureOut">
               <a:rPr lang="en-US" smtClean="0"/>
-              <a:t>2/9/24</a:t>
+              <a:t>2/13/24</a:t>
             </a:fld>
             <a:endParaRPr lang="en-US"/>
           </a:p>
@@ -917,7 +917,7 @@
           <a:p>
             <a:fld id="{9D275D05-B5B6-5946-BDB9-49EE6FE80DE5}" type="datetimeFigureOut">
               <a:rPr lang="en-US" smtClean="0"/>
-              <a:t>2/9/24</a:t>
+              <a:t>2/13/24</a:t>
             </a:fld>
             <a:endParaRPr lang="en-US"/>
           </a:p>
@@ -1125,7 +1125,7 @@
           <a:p>
             <a:fld id="{9D275D05-B5B6-5946-BDB9-49EE6FE80DE5}" type="datetimeFigureOut">
               <a:rPr lang="en-US" smtClean="0"/>
-              <a:t>2/9/24</a:t>
+              <a:t>2/13/24</a:t>
             </a:fld>
             <a:endParaRPr lang="en-US"/>
           </a:p>
@@ -1323,7 +1323,7 @@
           <a:p>
             <a:fld id="{9D275D05-B5B6-5946-BDB9-49EE6FE80DE5}" type="datetimeFigureOut">
               <a:rPr lang="en-US" smtClean="0"/>
-              <a:t>2/9/24</a:t>
+              <a:t>2/13/24</a:t>
             </a:fld>
             <a:endParaRPr lang="en-US"/>
           </a:p>
@@ -1598,7 +1598,7 @@
           <a:p>
             <a:fld id="{9D275D05-B5B6-5946-BDB9-49EE6FE80DE5}" type="datetimeFigureOut">
               <a:rPr lang="en-US" smtClean="0"/>
-              <a:t>2/9/24</a:t>
+              <a:t>2/13/24</a:t>
             </a:fld>
             <a:endParaRPr lang="en-US"/>
           </a:p>
@@ -1863,7 +1863,7 @@
           <a:p>
             <a:fld id="{9D275D05-B5B6-5946-BDB9-49EE6FE80DE5}" type="datetimeFigureOut">
               <a:rPr lang="en-US" smtClean="0"/>
-              <a:t>2/9/24</a:t>
+              <a:t>2/13/24</a:t>
             </a:fld>
             <a:endParaRPr lang="en-US"/>
           </a:p>
@@ -2275,7 +2275,7 @@
           <a:p>
             <a:fld id="{9D275D05-B5B6-5946-BDB9-49EE6FE80DE5}" type="datetimeFigureOut">
               <a:rPr lang="en-US" smtClean="0"/>
-              <a:t>2/9/24</a:t>
+              <a:t>2/13/24</a:t>
             </a:fld>
             <a:endParaRPr lang="en-US"/>
           </a:p>
@@ -2416,7 +2416,7 @@
           <a:p>
             <a:fld id="{9D275D05-B5B6-5946-BDB9-49EE6FE80DE5}" type="datetimeFigureOut">
               <a:rPr lang="en-US" smtClean="0"/>
-              <a:t>2/9/24</a:t>
+              <a:t>2/13/24</a:t>
             </a:fld>
             <a:endParaRPr lang="en-US"/>
           </a:p>
@@ -2529,7 +2529,7 @@
           <a:p>
             <a:fld id="{9D275D05-B5B6-5946-BDB9-49EE6FE80DE5}" type="datetimeFigureOut">
               <a:rPr lang="en-US" smtClean="0"/>
-              <a:t>2/9/24</a:t>
+              <a:t>2/13/24</a:t>
             </a:fld>
             <a:endParaRPr lang="en-US"/>
           </a:p>
@@ -2840,7 +2840,7 @@
           <a:p>
             <a:fld id="{9D275D05-B5B6-5946-BDB9-49EE6FE80DE5}" type="datetimeFigureOut">
               <a:rPr lang="en-US" smtClean="0"/>
-              <a:t>2/9/24</a:t>
+              <a:t>2/13/24</a:t>
             </a:fld>
             <a:endParaRPr lang="en-US"/>
           </a:p>
@@ -3128,7 +3128,7 @@
           <a:p>
             <a:fld id="{9D275D05-B5B6-5946-BDB9-49EE6FE80DE5}" type="datetimeFigureOut">
               <a:rPr lang="en-US" smtClean="0"/>
-              <a:t>2/9/24</a:t>
+              <a:t>2/13/24</a:t>
             </a:fld>
             <a:endParaRPr lang="en-US"/>
           </a:p>
@@ -3369,7 +3369,7 @@
           <a:p>
             <a:fld id="{9D275D05-B5B6-5946-BDB9-49EE6FE80DE5}" type="datetimeFigureOut">
               <a:rPr lang="en-US" smtClean="0"/>
-              <a:t>2/9/24</a:t>
+              <a:t>2/13/24</a:t>
             </a:fld>
             <a:endParaRPr lang="en-US"/>
           </a:p>
@@ -3794,10 +3794,10 @@
       </p:grpSpPr>
       <p:grpSp>
         <p:nvGrpSpPr>
-          <p:cNvPr id="4" name="Group 3">
-            <a:extLst>
-              <a:ext uri="{FF2B5EF4-FFF2-40B4-BE49-F238E27FC236}">
-                <a16:creationId xmlns:a16="http://schemas.microsoft.com/office/drawing/2014/main" id="{E8FDE8D7-8BD0-2A76-2B2D-D075F81A6206}"/>
+          <p:cNvPr id="11" name="Group 10">
+            <a:extLst>
+              <a:ext uri="{FF2B5EF4-FFF2-40B4-BE49-F238E27FC236}">
+                <a16:creationId xmlns:a16="http://schemas.microsoft.com/office/drawing/2014/main" id="{A57B5514-0F9F-0724-214C-9012C7F5C7A1}"/>
               </a:ext>
             </a:extLst>
           </p:cNvPr>
@@ -3864,6 +3864,52 @@
             </a:p>
           </p:txBody>
         </p:sp>
+        <p:cxnSp>
+          <p:nvCxnSpPr>
+            <p:cNvPr id="6" name="Straight Arrow Connector 5">
+              <a:extLst>
+                <a:ext uri="{FF2B5EF4-FFF2-40B4-BE49-F238E27FC236}">
+                  <a16:creationId xmlns:a16="http://schemas.microsoft.com/office/drawing/2014/main" id="{562FFC50-18C1-A9E3-455E-85A64358CC49}"/>
+                </a:ext>
+              </a:extLst>
+            </p:cNvPr>
+            <p:cNvCxnSpPr>
+              <a:cxnSpLocks/>
+              <a:endCxn id="2" idx="1"/>
+            </p:cNvCxnSpPr>
+            <p:nvPr/>
+          </p:nvCxnSpPr>
+          <p:spPr>
+            <a:xfrm>
+              <a:off x="2276547" y="1325880"/>
+              <a:ext cx="910222" cy="615990"/>
+            </a:xfrm>
+            <a:prstGeom prst="straightConnector1">
+              <a:avLst/>
+            </a:prstGeom>
+            <a:ln w="38100">
+              <a:solidFill>
+                <a:schemeClr val="tx1"/>
+              </a:solidFill>
+              <a:prstDash val="lgDash"/>
+              <a:tailEnd type="none"/>
+            </a:ln>
+          </p:spPr>
+          <p:style>
+            <a:lnRef idx="1">
+              <a:schemeClr val="accent1"/>
+            </a:lnRef>
+            <a:fillRef idx="0">
+              <a:schemeClr val="accent1"/>
+            </a:fillRef>
+            <a:effectRef idx="0">
+              <a:schemeClr val="accent1"/>
+            </a:effectRef>
+            <a:fontRef idx="minor">
+              <a:schemeClr val="tx1"/>
+            </a:fontRef>
+          </p:style>
+        </p:cxnSp>
         <p:sp>
           <p:nvSpPr>
             <p:cNvPr id="3" name="Oval 2">

</xml_diff>